<commit_message>
řešení a upravená prezentace
</commit_message>
<xml_diff>
--- a/prezentace/03_opakovaci_workshop_v_R_prezentace.pptx
+++ b/prezentace/03_opakovaci_workshop_v_R_prezentace.pptx
@@ -282,7 +282,7 @@
           <a:p>
             <a:fld id="{E6171E64-FE02-4DE5-B72F-53C3706641C3}" type="datetimeFigureOut">
               <a:rPr lang="en-US" smtClean="0"/>
-              <a:t>7/29/2024</a:t>
+              <a:t>7/30/2024</a:t>
             </a:fld>
             <a:endParaRPr lang="en-US"/>
           </a:p>
@@ -669,7 +669,7 @@
           <a:p>
             <a:fld id="{E6171E64-FE02-4DE5-B72F-53C3706641C3}" type="datetimeFigureOut">
               <a:rPr lang="en-US" smtClean="0"/>
-              <a:t>7/29/2024</a:t>
+              <a:t>7/30/2024</a:t>
             </a:fld>
             <a:endParaRPr lang="en-US"/>
           </a:p>
@@ -1062,7 +1062,7 @@
           <a:p>
             <a:fld id="{E6171E64-FE02-4DE5-B72F-53C3706641C3}" type="datetimeFigureOut">
               <a:rPr lang="en-US" smtClean="0"/>
-              <a:t>7/29/2024</a:t>
+              <a:t>7/30/2024</a:t>
             </a:fld>
             <a:endParaRPr lang="en-US"/>
           </a:p>
@@ -1477,7 +1477,7 @@
           <a:p>
             <a:fld id="{E6171E64-FE02-4DE5-B72F-53C3706641C3}" type="datetimeFigureOut">
               <a:rPr lang="en-US" smtClean="0"/>
-              <a:t>7/29/2024</a:t>
+              <a:t>7/30/2024</a:t>
             </a:fld>
             <a:endParaRPr lang="en-US"/>
           </a:p>
@@ -1819,7 +1819,7 @@
           <a:p>
             <a:fld id="{E6171E64-FE02-4DE5-B72F-53C3706641C3}" type="datetimeFigureOut">
               <a:rPr lang="en-US" smtClean="0"/>
-              <a:t>7/29/2024</a:t>
+              <a:t>7/30/2024</a:t>
             </a:fld>
             <a:endParaRPr lang="en-US"/>
           </a:p>
@@ -2143,7 +2143,7 @@
           <a:p>
             <a:fld id="{E6171E64-FE02-4DE5-B72F-53C3706641C3}" type="datetimeFigureOut">
               <a:rPr lang="en-US" smtClean="0"/>
-              <a:t>7/29/2024</a:t>
+              <a:t>7/30/2024</a:t>
             </a:fld>
             <a:endParaRPr lang="en-US"/>
           </a:p>
@@ -2624,7 +2624,7 @@
           <a:p>
             <a:fld id="{E6171E64-FE02-4DE5-B72F-53C3706641C3}" type="datetimeFigureOut">
               <a:rPr lang="en-US" smtClean="0"/>
-              <a:t>7/29/2024</a:t>
+              <a:t>7/30/2024</a:t>
             </a:fld>
             <a:endParaRPr lang="en-US"/>
           </a:p>
@@ -2786,7 +2786,7 @@
           <a:p>
             <a:fld id="{E6171E64-FE02-4DE5-B72F-53C3706641C3}" type="datetimeFigureOut">
               <a:rPr lang="en-US" smtClean="0"/>
-              <a:t>7/29/2024</a:t>
+              <a:t>7/30/2024</a:t>
             </a:fld>
             <a:endParaRPr lang="en-US"/>
           </a:p>
@@ -2899,7 +2899,7 @@
           <a:p>
             <a:fld id="{E6171E64-FE02-4DE5-B72F-53C3706641C3}" type="datetimeFigureOut">
               <a:rPr lang="en-US" smtClean="0"/>
-              <a:t>7/29/2024</a:t>
+              <a:t>7/30/2024</a:t>
             </a:fld>
             <a:endParaRPr lang="en-US"/>
           </a:p>
@@ -3221,7 +3221,7 @@
           <a:p>
             <a:fld id="{E6171E64-FE02-4DE5-B72F-53C3706641C3}" type="datetimeFigureOut">
               <a:rPr lang="en-US" smtClean="0"/>
-              <a:t>7/29/2024</a:t>
+              <a:t>7/30/2024</a:t>
             </a:fld>
             <a:endParaRPr lang="en-US"/>
           </a:p>
@@ -3523,7 +3523,7 @@
           <a:p>
             <a:fld id="{E6171E64-FE02-4DE5-B72F-53C3706641C3}" type="datetimeFigureOut">
               <a:rPr lang="en-US" smtClean="0"/>
-              <a:t>7/29/2024</a:t>
+              <a:t>7/30/2024</a:t>
             </a:fld>
             <a:endParaRPr lang="en-US"/>
           </a:p>
@@ -3764,7 +3764,7 @@
           <a:p>
             <a:fld id="{E6171E64-FE02-4DE5-B72F-53C3706641C3}" type="datetimeFigureOut">
               <a:rPr lang="en-US" smtClean="0"/>
-              <a:t>7/29/2024</a:t>
+              <a:t>7/30/2024</a:t>
             </a:fld>
             <a:endParaRPr lang="en-US"/>
           </a:p>
@@ -6656,7 +6656,7 @@
         <p:spPr/>
         <p:txBody>
           <a:bodyPr>
-            <a:normAutofit fontScale="92500" lnSpcReduction="10000"/>
+            <a:normAutofit fontScale="92500" lnSpcReduction="20000"/>
           </a:bodyPr>
           <a:lstStyle/>
           <a:p>
@@ -6768,11 +6768,25 @@
                   <a:srgbClr val="C00000"/>
                 </a:solidFill>
               </a:rPr>
-              <a:t>11:20 – 11:30 </a:t>
+              <a:t>11:10 – 11:20 </a:t>
             </a:r>
             <a:r>
               <a:rPr lang="cs-CZ" sz="1800" b="1" dirty="0"/>
               <a:t>– feedback – co jsi stihl/a, na jaké problémy jsi narazila/a </a:t>
+            </a:r>
+          </a:p>
+          <a:p>
+            <a:r>
+              <a:rPr lang="cs-CZ" sz="1800" b="1" dirty="0">
+                <a:solidFill>
+                  <a:srgbClr val="C00000"/>
+                </a:solidFill>
+              </a:rPr>
+              <a:t>11:20 – 11:30 </a:t>
+            </a:r>
+            <a:r>
+              <a:rPr lang="cs-CZ" sz="1800" b="1" dirty="0"/>
+              <a:t>– ukázka řešení</a:t>
             </a:r>
           </a:p>
           <a:p>

</xml_diff>